<commit_message>
Last Update 24-09-2018 10:37:31.73
</commit_message>
<xml_diff>
--- a/Slides/Unit 1/CS8392-U1-8-Constrctor.pptx
+++ b/Slides/Unit 1/CS8392-U1-8-Constrctor.pptx
@@ -5,7 +5,7 @@
     <p:sldMasterId id="2147483648" r:id="rId1"/>
   </p:sldMasterIdLst>
   <p:notesMasterIdLst>
-    <p:notesMasterId r:id="rId11"/>
+    <p:notesMasterId r:id="rId12"/>
   </p:notesMasterIdLst>
   <p:sldIdLst>
     <p:sldId id="256" r:id="rId2"/>
@@ -16,7 +16,8 @@
     <p:sldId id="278" r:id="rId7"/>
     <p:sldId id="276" r:id="rId8"/>
     <p:sldId id="279" r:id="rId9"/>
-    <p:sldId id="272" r:id="rId10"/>
+    <p:sldId id="280" r:id="rId10"/>
+    <p:sldId id="272" r:id="rId11"/>
   </p:sldIdLst>
   <p:sldSz cx="9144000" cy="6858000" type="screen4x3"/>
   <p:notesSz cx="6858000" cy="9144000"/>
@@ -201,7 +202,7 @@
             <a:fld id="{9515075B-F3F0-4441-A1BD-B7B515B708FF}" type="datetimeFigureOut">
               <a:rPr lang="en-US" smtClean="0"/>
               <a:pPr/>
-              <a:t>7/13/2018</a:t>
+              <a:t>9/23/2018</a:t>
             </a:fld>
             <a:endParaRPr lang="en-US"/>
           </a:p>
@@ -656,7 +657,7 @@
             <a:fld id="{6E658DF8-B8C0-4C7F-85EB-B53A2DDD44A9}" type="datetimeFigureOut">
               <a:rPr lang="en-US" smtClean="0"/>
               <a:pPr/>
-              <a:t>7/13/2018</a:t>
+              <a:t>9/23/2018</a:t>
             </a:fld>
             <a:endParaRPr lang="en-US"/>
           </a:p>
@@ -823,7 +824,7 @@
             <a:fld id="{6E658DF8-B8C0-4C7F-85EB-B53A2DDD44A9}" type="datetimeFigureOut">
               <a:rPr lang="en-US" smtClean="0"/>
               <a:pPr/>
-              <a:t>7/13/2018</a:t>
+              <a:t>9/23/2018</a:t>
             </a:fld>
             <a:endParaRPr lang="en-US"/>
           </a:p>
@@ -1000,7 +1001,7 @@
             <a:fld id="{6E658DF8-B8C0-4C7F-85EB-B53A2DDD44A9}" type="datetimeFigureOut">
               <a:rPr lang="en-US" smtClean="0"/>
               <a:pPr/>
-              <a:t>7/13/2018</a:t>
+              <a:t>9/23/2018</a:t>
             </a:fld>
             <a:endParaRPr lang="en-US"/>
           </a:p>
@@ -1199,7 +1200,7 @@
             <a:fld id="{6E658DF8-B8C0-4C7F-85EB-B53A2DDD44A9}" type="datetimeFigureOut">
               <a:rPr lang="en-US" smtClean="0"/>
               <a:pPr/>
-              <a:t>7/13/2018</a:t>
+              <a:t>9/23/2018</a:t>
             </a:fld>
             <a:endParaRPr lang="en-US"/>
           </a:p>
@@ -1442,7 +1443,7 @@
             <a:fld id="{6E658DF8-B8C0-4C7F-85EB-B53A2DDD44A9}" type="datetimeFigureOut">
               <a:rPr lang="en-US" smtClean="0"/>
               <a:pPr/>
-              <a:t>7/13/2018</a:t>
+              <a:t>9/23/2018</a:t>
             </a:fld>
             <a:endParaRPr lang="en-US"/>
           </a:p>
@@ -1727,7 +1728,7 @@
             <a:fld id="{6E658DF8-B8C0-4C7F-85EB-B53A2DDD44A9}" type="datetimeFigureOut">
               <a:rPr lang="en-US" smtClean="0"/>
               <a:pPr/>
-              <a:t>7/13/2018</a:t>
+              <a:t>9/23/2018</a:t>
             </a:fld>
             <a:endParaRPr lang="en-US"/>
           </a:p>
@@ -2146,7 +2147,7 @@
             <a:fld id="{6E658DF8-B8C0-4C7F-85EB-B53A2DDD44A9}" type="datetimeFigureOut">
               <a:rPr lang="en-US" smtClean="0"/>
               <a:pPr/>
-              <a:t>7/13/2018</a:t>
+              <a:t>9/23/2018</a:t>
             </a:fld>
             <a:endParaRPr lang="en-US"/>
           </a:p>
@@ -2261,7 +2262,7 @@
             <a:fld id="{6E658DF8-B8C0-4C7F-85EB-B53A2DDD44A9}" type="datetimeFigureOut">
               <a:rPr lang="en-US" smtClean="0"/>
               <a:pPr/>
-              <a:t>7/13/2018</a:t>
+              <a:t>9/23/2018</a:t>
             </a:fld>
             <a:endParaRPr lang="en-US"/>
           </a:p>
@@ -2353,7 +2354,7 @@
             <a:fld id="{6E658DF8-B8C0-4C7F-85EB-B53A2DDD44A9}" type="datetimeFigureOut">
               <a:rPr lang="en-US" smtClean="0"/>
               <a:pPr/>
-              <a:t>7/13/2018</a:t>
+              <a:t>9/23/2018</a:t>
             </a:fld>
             <a:endParaRPr lang="en-US"/>
           </a:p>
@@ -2627,7 +2628,7 @@
             <a:fld id="{6E658DF8-B8C0-4C7F-85EB-B53A2DDD44A9}" type="datetimeFigureOut">
               <a:rPr lang="en-US" smtClean="0"/>
               <a:pPr/>
-              <a:t>7/13/2018</a:t>
+              <a:t>9/23/2018</a:t>
             </a:fld>
             <a:endParaRPr lang="en-US"/>
           </a:p>
@@ -2877,7 +2878,7 @@
             <a:fld id="{6E658DF8-B8C0-4C7F-85EB-B53A2DDD44A9}" type="datetimeFigureOut">
               <a:rPr lang="en-US" smtClean="0"/>
               <a:pPr/>
-              <a:t>7/13/2018</a:t>
+              <a:t>9/23/2018</a:t>
             </a:fld>
             <a:endParaRPr lang="en-US"/>
           </a:p>
@@ -3093,7 +3094,7 @@
             <a:fld id="{6E658DF8-B8C0-4C7F-85EB-B53A2DDD44A9}" type="datetimeFigureOut">
               <a:rPr lang="en-US" smtClean="0"/>
               <a:pPr/>
-              <a:t>7/13/2018</a:t>
+              <a:t>9/23/2018</a:t>
             </a:fld>
             <a:endParaRPr lang="en-US"/>
           </a:p>
@@ -3658,6 +3659,375 @@
 </p:sld>
 </file>
 
+<file path=ppt/slides/slide10.xml><?xml version="1.0" encoding="utf-8"?>
+<p:sld xmlns:a="http://schemas.openxmlformats.org/drawingml/2006/main" xmlns:r="http://schemas.openxmlformats.org/officeDocument/2006/relationships" xmlns:p="http://schemas.openxmlformats.org/presentationml/2006/main">
+  <p:cSld>
+    <p:spTree>
+      <p:nvGrpSpPr>
+        <p:cNvPr id="1" name=""/>
+        <p:cNvGrpSpPr/>
+        <p:nvPr/>
+      </p:nvGrpSpPr>
+      <p:grpSpPr>
+        <a:xfrm>
+          <a:off x="0" y="0"/>
+          <a:ext cx="0" cy="0"/>
+          <a:chOff x="0" y="0"/>
+          <a:chExt cx="0" cy="0"/>
+        </a:xfrm>
+      </p:grpSpPr>
+      <p:sp>
+        <p:nvSpPr>
+          <p:cNvPr id="2" name="Title 1"/>
+          <p:cNvSpPr>
+            <a:spLocks noGrp="1"/>
+          </p:cNvSpPr>
+          <p:nvPr>
+            <p:ph type="title"/>
+          </p:nvPr>
+        </p:nvSpPr>
+        <p:spPr>
+          <a:xfrm>
+            <a:off x="457200" y="1981200"/>
+            <a:ext cx="8229600" cy="1143000"/>
+          </a:xfrm>
+        </p:spPr>
+        <p:txBody>
+          <a:bodyPr/>
+          <a:lstStyle/>
+          <a:p>
+            <a:r>
+              <a:rPr lang="en-US" dirty="0" smtClean="0"/>
+              <a:t>Thank You</a:t>
+            </a:r>
+            <a:endParaRPr lang="en-US" dirty="0"/>
+          </a:p>
+        </p:txBody>
+      </p:sp>
+      <p:sp>
+        <p:nvSpPr>
+          <p:cNvPr id="4" name="Subtitle 2"/>
+          <p:cNvSpPr txBox="1">
+            <a:spLocks/>
+          </p:cNvSpPr>
+          <p:nvPr/>
+        </p:nvSpPr>
+        <p:spPr>
+          <a:xfrm>
+            <a:off x="4038600" y="4191000"/>
+            <a:ext cx="4191000" cy="1752600"/>
+          </a:xfrm>
+          <a:prstGeom prst="rect">
+            <a:avLst/>
+          </a:prstGeom>
+        </p:spPr>
+        <p:txBody>
+          <a:bodyPr vert="horz" lIns="91440" tIns="45720" rIns="91440" bIns="45720" rtlCol="0">
+            <a:normAutofit fontScale="92500" lnSpcReduction="10000"/>
+          </a:bodyPr>
+          <a:lstStyle/>
+          <a:p>
+            <a:pPr marL="342900" marR="0" lvl="0" indent="-342900" algn="r" defTabSz="914400" rtl="0" eaLnBrk="1" fontAlgn="auto" latinLnBrk="0" hangingPunct="1">
+              <a:lnSpc>
+                <a:spcPct val="100000"/>
+              </a:lnSpc>
+              <a:spcBef>
+                <a:spcPct val="20000"/>
+              </a:spcBef>
+              <a:spcAft>
+                <a:spcPts val="0"/>
+              </a:spcAft>
+              <a:buClrTx/>
+              <a:buSzTx/>
+              <a:tabLst/>
+              <a:defRPr/>
+            </a:pPr>
+            <a:r>
+              <a:rPr kumimoji="0" lang="en-US" sz="2200" b="0" i="0" u="none" strike="noStrike" kern="1200" cap="none" spc="0" normalizeH="0" baseline="0" noProof="0" dirty="0" err="1" smtClean="0">
+                <a:ln>
+                  <a:noFill/>
+                </a:ln>
+                <a:solidFill>
+                  <a:schemeClr val="tx1"/>
+                </a:solidFill>
+                <a:effectLst/>
+                <a:uLnTx/>
+                <a:uFillTx/>
+                <a:latin typeface="Cambria" pitchFamily="18" charset="0"/>
+                <a:ea typeface="+mn-ea"/>
+                <a:cs typeface="+mn-cs"/>
+              </a:rPr>
+              <a:t>Rajasekaran</a:t>
+            </a:r>
+            <a:r>
+              <a:rPr kumimoji="0" lang="en-US" sz="2200" b="0" i="0" u="none" strike="noStrike" kern="1200" cap="none" spc="0" normalizeH="0" baseline="0" noProof="0" dirty="0" smtClean="0">
+                <a:ln>
+                  <a:noFill/>
+                </a:ln>
+                <a:solidFill>
+                  <a:schemeClr val="tx1"/>
+                </a:solidFill>
+                <a:effectLst/>
+                <a:uLnTx/>
+                <a:uFillTx/>
+                <a:latin typeface="Cambria" pitchFamily="18" charset="0"/>
+                <a:ea typeface="+mn-ea"/>
+                <a:cs typeface="+mn-cs"/>
+              </a:rPr>
+              <a:t> S</a:t>
+            </a:r>
+          </a:p>
+          <a:p>
+            <a:pPr marL="342900" marR="0" lvl="0" indent="-342900" algn="r" defTabSz="914400" rtl="0" eaLnBrk="1" fontAlgn="auto" latinLnBrk="0" hangingPunct="1">
+              <a:lnSpc>
+                <a:spcPct val="100000"/>
+              </a:lnSpc>
+              <a:spcBef>
+                <a:spcPct val="20000"/>
+              </a:spcBef>
+              <a:spcAft>
+                <a:spcPts val="0"/>
+              </a:spcAft>
+              <a:buClrTx/>
+              <a:buSzTx/>
+              <a:tabLst/>
+              <a:defRPr/>
+            </a:pPr>
+            <a:r>
+              <a:rPr kumimoji="0" lang="en-US" sz="1600" b="0" i="0" u="none" strike="noStrike" kern="1200" cap="none" spc="0" normalizeH="0" baseline="0" noProof="0" dirty="0" smtClean="0">
+                <a:ln>
+                  <a:noFill/>
+                </a:ln>
+                <a:solidFill>
+                  <a:schemeClr val="tx1"/>
+                </a:solidFill>
+                <a:effectLst/>
+                <a:uLnTx/>
+                <a:uFillTx/>
+                <a:latin typeface="Cambria" pitchFamily="18" charset="0"/>
+                <a:ea typeface="+mn-ea"/>
+                <a:cs typeface="+mn-cs"/>
+              </a:rPr>
+              <a:t>Assistant Professor,</a:t>
+            </a:r>
+          </a:p>
+          <a:p>
+            <a:pPr marL="342900" marR="0" lvl="0" indent="-342900" algn="r" defTabSz="914400" rtl="0" eaLnBrk="1" fontAlgn="auto" latinLnBrk="0" hangingPunct="1">
+              <a:lnSpc>
+                <a:spcPct val="100000"/>
+              </a:lnSpc>
+              <a:spcBef>
+                <a:spcPct val="20000"/>
+              </a:spcBef>
+              <a:spcAft>
+                <a:spcPts val="0"/>
+              </a:spcAft>
+              <a:buClrTx/>
+              <a:buSzTx/>
+              <a:tabLst/>
+              <a:defRPr/>
+            </a:pPr>
+            <a:r>
+              <a:rPr kumimoji="0" lang="en-US" sz="1600" b="0" i="0" u="none" strike="noStrike" kern="1200" cap="none" spc="0" normalizeH="0" baseline="0" noProof="0" dirty="0" smtClean="0">
+                <a:ln>
+                  <a:noFill/>
+                </a:ln>
+                <a:solidFill>
+                  <a:schemeClr val="tx1"/>
+                </a:solidFill>
+                <a:effectLst/>
+                <a:uLnTx/>
+                <a:uFillTx/>
+                <a:latin typeface="Cambria" pitchFamily="18" charset="0"/>
+                <a:ea typeface="+mn-ea"/>
+                <a:cs typeface="+mn-cs"/>
+              </a:rPr>
+              <a:t>Department of Information Technology,</a:t>
+            </a:r>
+          </a:p>
+          <a:p>
+            <a:pPr marL="342900" marR="0" lvl="0" indent="-342900" algn="r" defTabSz="914400" rtl="0" eaLnBrk="1" fontAlgn="auto" latinLnBrk="0" hangingPunct="1">
+              <a:lnSpc>
+                <a:spcPct val="100000"/>
+              </a:lnSpc>
+              <a:spcBef>
+                <a:spcPct val="20000"/>
+              </a:spcBef>
+              <a:spcAft>
+                <a:spcPts val="0"/>
+              </a:spcAft>
+              <a:buClrTx/>
+              <a:buSzTx/>
+              <a:tabLst/>
+              <a:defRPr/>
+            </a:pPr>
+            <a:r>
+              <a:rPr kumimoji="0" lang="en-US" sz="1600" b="0" i="0" u="none" strike="noStrike" kern="1200" cap="none" spc="0" normalizeH="0" baseline="0" noProof="0" dirty="0" err="1" smtClean="0">
+                <a:ln>
+                  <a:noFill/>
+                </a:ln>
+                <a:solidFill>
+                  <a:schemeClr val="tx1"/>
+                </a:solidFill>
+                <a:effectLst/>
+                <a:uLnTx/>
+                <a:uFillTx/>
+                <a:latin typeface="Cambria" pitchFamily="18" charset="0"/>
+                <a:ea typeface="+mn-ea"/>
+                <a:cs typeface="+mn-cs"/>
+              </a:rPr>
+              <a:t>KGiSL</a:t>
+            </a:r>
+            <a:r>
+              <a:rPr kumimoji="0" lang="en-US" sz="1600" b="0" i="0" u="none" strike="noStrike" kern="1200" cap="none" spc="0" normalizeH="0" baseline="0" noProof="0" dirty="0" smtClean="0">
+                <a:ln>
+                  <a:noFill/>
+                </a:ln>
+                <a:solidFill>
+                  <a:schemeClr val="tx1"/>
+                </a:solidFill>
+                <a:effectLst/>
+                <a:uLnTx/>
+                <a:uFillTx/>
+                <a:latin typeface="Cambria" pitchFamily="18" charset="0"/>
+                <a:ea typeface="+mn-ea"/>
+                <a:cs typeface="+mn-cs"/>
+              </a:rPr>
+              <a:t> Institute of Technology,</a:t>
+            </a:r>
+          </a:p>
+          <a:p>
+            <a:pPr marL="342900" marR="0" lvl="0" indent="-342900" algn="r" defTabSz="914400" rtl="0" eaLnBrk="1" fontAlgn="auto" latinLnBrk="0" hangingPunct="1">
+              <a:lnSpc>
+                <a:spcPct val="100000"/>
+              </a:lnSpc>
+              <a:spcBef>
+                <a:spcPct val="20000"/>
+              </a:spcBef>
+              <a:spcAft>
+                <a:spcPts val="0"/>
+              </a:spcAft>
+              <a:buClrTx/>
+              <a:buSzTx/>
+              <a:tabLst/>
+              <a:defRPr/>
+            </a:pPr>
+            <a:r>
+              <a:rPr kumimoji="0" lang="en-US" sz="1600" b="0" i="0" u="none" strike="noStrike" kern="1200" cap="none" spc="0" normalizeH="0" baseline="0" noProof="0" dirty="0" smtClean="0">
+                <a:ln>
+                  <a:noFill/>
+                </a:ln>
+                <a:solidFill>
+                  <a:schemeClr val="tx1"/>
+                </a:solidFill>
+                <a:effectLst/>
+                <a:uLnTx/>
+                <a:uFillTx/>
+                <a:latin typeface="Cambria" pitchFamily="18" charset="0"/>
+                <a:ea typeface="+mn-ea"/>
+                <a:cs typeface="+mn-cs"/>
+              </a:rPr>
+              <a:t>email: </a:t>
+            </a:r>
+            <a:r>
+              <a:rPr kumimoji="0" lang="en-US" sz="1600" b="0" i="0" u="none" strike="noStrike" kern="1200" cap="none" spc="0" normalizeH="0" baseline="0" noProof="0" dirty="0" smtClean="0">
+                <a:ln>
+                  <a:noFill/>
+                </a:ln>
+                <a:solidFill>
+                  <a:schemeClr val="tx1"/>
+                </a:solidFill>
+                <a:effectLst/>
+                <a:uLnTx/>
+                <a:uFillTx/>
+                <a:latin typeface="Cambria" pitchFamily="18" charset="0"/>
+                <a:ea typeface="+mn-ea"/>
+                <a:cs typeface="+mn-cs"/>
+                <a:hlinkClick r:id="rId2"/>
+              </a:rPr>
+              <a:t>proffraja@gmail.com</a:t>
+            </a:r>
+            <a:endParaRPr lang="en-US" sz="1600" dirty="0" smtClean="0">
+              <a:latin typeface="Cambria" pitchFamily="18" charset="0"/>
+            </a:endParaRPr>
+          </a:p>
+          <a:p>
+            <a:pPr marL="342900" marR="0" lvl="0" indent="-342900" algn="r" defTabSz="914400" rtl="0" eaLnBrk="1" fontAlgn="auto" latinLnBrk="0" hangingPunct="1">
+              <a:lnSpc>
+                <a:spcPct val="100000"/>
+              </a:lnSpc>
+              <a:spcBef>
+                <a:spcPct val="20000"/>
+              </a:spcBef>
+              <a:spcAft>
+                <a:spcPts val="0"/>
+              </a:spcAft>
+              <a:buClrTx/>
+              <a:buSzTx/>
+              <a:tabLst/>
+              <a:defRPr/>
+            </a:pPr>
+            <a:r>
+              <a:rPr lang="en-US" sz="1600" dirty="0" err="1" smtClean="0">
+                <a:latin typeface="Cambria" pitchFamily="18" charset="0"/>
+              </a:rPr>
+              <a:t>Github:</a:t>
+            </a:r>
+            <a:r>
+              <a:rPr lang="en-US" sz="1600" dirty="0" err="1" smtClean="0">
+                <a:latin typeface="Cambria" pitchFamily="18" charset="0"/>
+                <a:hlinkClick r:id="rId3"/>
+              </a:rPr>
+              <a:t>www.github.com</a:t>
+            </a:r>
+            <a:r>
+              <a:rPr lang="en-US" sz="1600" dirty="0" smtClean="0">
+                <a:latin typeface="Cambria" pitchFamily="18" charset="0"/>
+                <a:hlinkClick r:id="rId3"/>
+              </a:rPr>
+              <a:t>/</a:t>
+            </a:r>
+            <a:r>
+              <a:rPr lang="en-US" sz="1600" dirty="0" err="1" smtClean="0">
+                <a:latin typeface="Cambria" pitchFamily="18" charset="0"/>
+                <a:hlinkClick r:id="rId3"/>
+              </a:rPr>
+              <a:t>rajasekaranap</a:t>
+            </a:r>
+            <a:endParaRPr lang="en-US" sz="1600" dirty="0" smtClean="0">
+              <a:latin typeface="Cambria" pitchFamily="18" charset="0"/>
+            </a:endParaRPr>
+          </a:p>
+          <a:p>
+            <a:pPr marL="342900" marR="0" lvl="0" indent="-342900" algn="r" defTabSz="914400" rtl="0" eaLnBrk="1" fontAlgn="auto" latinLnBrk="0" hangingPunct="1">
+              <a:lnSpc>
+                <a:spcPct val="100000"/>
+              </a:lnSpc>
+              <a:spcBef>
+                <a:spcPct val="20000"/>
+              </a:spcBef>
+              <a:spcAft>
+                <a:spcPts val="0"/>
+              </a:spcAft>
+              <a:buClrTx/>
+              <a:buSzTx/>
+              <a:tabLst/>
+              <a:defRPr/>
+            </a:pPr>
+            <a:endParaRPr lang="en-US" sz="1600" dirty="0" smtClean="0">
+              <a:latin typeface="Cambria" pitchFamily="18" charset="0"/>
+            </a:endParaRPr>
+          </a:p>
+        </p:txBody>
+      </p:sp>
+    </p:spTree>
+  </p:cSld>
+  <p:clrMapOvr>
+    <a:masterClrMapping/>
+  </p:clrMapOvr>
+</p:sld>
+</file>
+
 <file path=ppt/slides/slide2.xml><?xml version="1.0" encoding="utf-8"?>
 <p:sld xmlns:a="http://schemas.openxmlformats.org/drawingml/2006/main" xmlns:r="http://schemas.openxmlformats.org/officeDocument/2006/relationships" xmlns:p="http://schemas.openxmlformats.org/presentationml/2006/main">
   <p:cSld>
@@ -3717,23 +4087,36 @@
               <a:rPr lang="en-US" dirty="0" smtClean="0"/>
               <a:t>Constructor is special type of method member in class.</a:t>
             </a:r>
-            <a:endParaRPr lang="en-US" dirty="0" smtClean="0"/>
           </a:p>
           <a:p>
             <a:r>
               <a:rPr lang="en-US" dirty="0" smtClean="0"/>
-              <a:t>It is method that used </a:t>
-            </a:r>
-            <a:r>
-              <a:rPr lang="en-US" smtClean="0"/>
-              <a:t>to initialize objects.</a:t>
-            </a:r>
-            <a:endParaRPr lang="en-US" dirty="0" smtClean="0"/>
-          </a:p>
-          <a:p>
-            <a:endParaRPr lang="en-US" dirty="0" smtClean="0"/>
-          </a:p>
-          <a:p>
+              <a:t>It is method that used to initialize objects.</a:t>
+            </a:r>
+          </a:p>
+          <a:p>
+            <a:r>
+              <a:rPr lang="en-IN" dirty="0" smtClean="0"/>
+              <a:t>It resembles the class name</a:t>
+            </a:r>
+          </a:p>
+          <a:p>
+            <a:r>
+              <a:rPr lang="en-IN" dirty="0" smtClean="0"/>
+              <a:t>It doesn't have any return type.</a:t>
+            </a:r>
+          </a:p>
+          <a:p>
+            <a:r>
+              <a:rPr lang="en-IN" dirty="0" smtClean="0"/>
+              <a:t>It cannot be called.</a:t>
+            </a:r>
+          </a:p>
+          <a:p>
+            <a:r>
+              <a:rPr lang="en-IN" dirty="0" smtClean="0"/>
+              <a:t>It is automatically called at the time of object creation. </a:t>
+            </a:r>
             <a:endParaRPr lang="en-US" dirty="0" smtClean="0"/>
           </a:p>
         </p:txBody>
@@ -6472,19 +6855,14 @@
             <p:ph type="title"/>
           </p:nvPr>
         </p:nvSpPr>
-        <p:spPr>
-          <a:xfrm>
-            <a:off x="457200" y="1981200"/>
-            <a:ext cx="8229600" cy="1143000"/>
-          </a:xfrm>
-        </p:spPr>
+        <p:spPr/>
         <p:txBody>
           <a:bodyPr/>
           <a:lstStyle/>
           <a:p>
             <a:r>
-              <a:rPr lang="en-US" dirty="0" smtClean="0"/>
-              <a:t>Thank You</a:t>
+              <a:rPr lang="en-IN" dirty="0" smtClean="0"/>
+              <a:t>Parameterized Constructor </a:t>
             </a:r>
             <a:endParaRPr lang="en-US" dirty="0"/>
           </a:p>
@@ -6492,317 +6870,36 @@
       </p:sp>
       <p:sp>
         <p:nvSpPr>
-          <p:cNvPr id="4" name="Subtitle 2"/>
-          <p:cNvSpPr txBox="1">
-            <a:spLocks/>
-          </p:cNvSpPr>
-          <p:nvPr/>
-        </p:nvSpPr>
-        <p:spPr>
-          <a:xfrm>
-            <a:off x="4038600" y="4191000"/>
-            <a:ext cx="4191000" cy="1752600"/>
-          </a:xfrm>
-          <a:prstGeom prst="rect">
-            <a:avLst/>
-          </a:prstGeom>
-        </p:spPr>
-        <p:txBody>
-          <a:bodyPr vert="horz" lIns="91440" tIns="45720" rIns="91440" bIns="45720" rtlCol="0">
-            <a:normAutofit fontScale="92500" lnSpcReduction="10000"/>
-          </a:bodyPr>
+          <p:cNvPr id="3" name="Content Placeholder 2"/>
+          <p:cNvSpPr>
+            <a:spLocks noGrp="1"/>
+          </p:cNvSpPr>
+          <p:nvPr>
+            <p:ph idx="1"/>
+          </p:nvPr>
+        </p:nvSpPr>
+        <p:spPr/>
+        <p:txBody>
+          <a:bodyPr/>
           <a:lstStyle/>
           <a:p>
-            <a:pPr marL="342900" marR="0" lvl="0" indent="-342900" algn="r" defTabSz="914400" rtl="0" eaLnBrk="1" fontAlgn="auto" latinLnBrk="0" hangingPunct="1">
-              <a:lnSpc>
-                <a:spcPct val="100000"/>
-              </a:lnSpc>
-              <a:spcBef>
-                <a:spcPct val="20000"/>
-              </a:spcBef>
-              <a:spcAft>
-                <a:spcPts val="0"/>
-              </a:spcAft>
-              <a:buClrTx/>
-              <a:buSzTx/>
-              <a:tabLst/>
-              <a:defRPr/>
-            </a:pPr>
-            <a:r>
-              <a:rPr kumimoji="0" lang="en-US" sz="2200" b="0" i="0" u="none" strike="noStrike" kern="1200" cap="none" spc="0" normalizeH="0" baseline="0" noProof="0" dirty="0" err="1" smtClean="0">
-                <a:ln>
-                  <a:noFill/>
-                </a:ln>
-                <a:solidFill>
-                  <a:schemeClr val="tx1"/>
-                </a:solidFill>
-                <a:effectLst/>
-                <a:uLnTx/>
-                <a:uFillTx/>
-                <a:latin typeface="Cambria" pitchFamily="18" charset="0"/>
-                <a:ea typeface="+mn-ea"/>
-                <a:cs typeface="+mn-cs"/>
-              </a:rPr>
-              <a:t>Rajasekaran</a:t>
-            </a:r>
-            <a:r>
-              <a:rPr kumimoji="0" lang="en-US" sz="2200" b="0" i="0" u="none" strike="noStrike" kern="1200" cap="none" spc="0" normalizeH="0" baseline="0" noProof="0" dirty="0" smtClean="0">
-                <a:ln>
-                  <a:noFill/>
-                </a:ln>
-                <a:solidFill>
-                  <a:schemeClr val="tx1"/>
-                </a:solidFill>
-                <a:effectLst/>
-                <a:uLnTx/>
-                <a:uFillTx/>
-                <a:latin typeface="Cambria" pitchFamily="18" charset="0"/>
-                <a:ea typeface="+mn-ea"/>
-                <a:cs typeface="+mn-cs"/>
-              </a:rPr>
-              <a:t> S</a:t>
-            </a:r>
-          </a:p>
-          <a:p>
-            <a:pPr marL="342900" marR="0" lvl="0" indent="-342900" algn="r" defTabSz="914400" rtl="0" eaLnBrk="1" fontAlgn="auto" latinLnBrk="0" hangingPunct="1">
-              <a:lnSpc>
-                <a:spcPct val="100000"/>
-              </a:lnSpc>
-              <a:spcBef>
-                <a:spcPct val="20000"/>
-              </a:spcBef>
-              <a:spcAft>
-                <a:spcPts val="0"/>
-              </a:spcAft>
-              <a:buClrTx/>
-              <a:buSzTx/>
-              <a:tabLst/>
-              <a:defRPr/>
-            </a:pPr>
-            <a:r>
-              <a:rPr kumimoji="0" lang="en-US" sz="1600" b="0" i="0" u="none" strike="noStrike" kern="1200" cap="none" spc="0" normalizeH="0" baseline="0" noProof="0" dirty="0" smtClean="0">
-                <a:ln>
-                  <a:noFill/>
-                </a:ln>
-                <a:solidFill>
-                  <a:schemeClr val="tx1"/>
-                </a:solidFill>
-                <a:effectLst/>
-                <a:uLnTx/>
-                <a:uFillTx/>
-                <a:latin typeface="Cambria" pitchFamily="18" charset="0"/>
-                <a:ea typeface="+mn-ea"/>
-                <a:cs typeface="+mn-cs"/>
-              </a:rPr>
-              <a:t>Assistant Professor,</a:t>
-            </a:r>
-          </a:p>
-          <a:p>
-            <a:pPr marL="342900" marR="0" lvl="0" indent="-342900" algn="r" defTabSz="914400" rtl="0" eaLnBrk="1" fontAlgn="auto" latinLnBrk="0" hangingPunct="1">
-              <a:lnSpc>
-                <a:spcPct val="100000"/>
-              </a:lnSpc>
-              <a:spcBef>
-                <a:spcPct val="20000"/>
-              </a:spcBef>
-              <a:spcAft>
-                <a:spcPts val="0"/>
-              </a:spcAft>
-              <a:buClrTx/>
-              <a:buSzTx/>
-              <a:tabLst/>
-              <a:defRPr/>
-            </a:pPr>
-            <a:r>
-              <a:rPr kumimoji="0" lang="en-US" sz="1600" b="0" i="0" u="none" strike="noStrike" kern="1200" cap="none" spc="0" normalizeH="0" baseline="0" noProof="0" dirty="0" smtClean="0">
-                <a:ln>
-                  <a:noFill/>
-                </a:ln>
-                <a:solidFill>
-                  <a:schemeClr val="tx1"/>
-                </a:solidFill>
-                <a:effectLst/>
-                <a:uLnTx/>
-                <a:uFillTx/>
-                <a:latin typeface="Cambria" pitchFamily="18" charset="0"/>
-                <a:ea typeface="+mn-ea"/>
-                <a:cs typeface="+mn-cs"/>
-              </a:rPr>
-              <a:t>Department of Information Technology,</a:t>
-            </a:r>
-          </a:p>
-          <a:p>
-            <a:pPr marL="342900" marR="0" lvl="0" indent="-342900" algn="r" defTabSz="914400" rtl="0" eaLnBrk="1" fontAlgn="auto" latinLnBrk="0" hangingPunct="1">
-              <a:lnSpc>
-                <a:spcPct val="100000"/>
-              </a:lnSpc>
-              <a:spcBef>
-                <a:spcPct val="20000"/>
-              </a:spcBef>
-              <a:spcAft>
-                <a:spcPts val="0"/>
-              </a:spcAft>
-              <a:buClrTx/>
-              <a:buSzTx/>
-              <a:tabLst/>
-              <a:defRPr/>
-            </a:pPr>
-            <a:r>
-              <a:rPr kumimoji="0" lang="en-US" sz="1600" b="0" i="0" u="none" strike="noStrike" kern="1200" cap="none" spc="0" normalizeH="0" baseline="0" noProof="0" dirty="0" err="1" smtClean="0">
-                <a:ln>
-                  <a:noFill/>
-                </a:ln>
-                <a:solidFill>
-                  <a:schemeClr val="tx1"/>
-                </a:solidFill>
-                <a:effectLst/>
-                <a:uLnTx/>
-                <a:uFillTx/>
-                <a:latin typeface="Cambria" pitchFamily="18" charset="0"/>
-                <a:ea typeface="+mn-ea"/>
-                <a:cs typeface="+mn-cs"/>
-              </a:rPr>
-              <a:t>KGiSL</a:t>
-            </a:r>
-            <a:r>
-              <a:rPr kumimoji="0" lang="en-US" sz="1600" b="0" i="0" u="none" strike="noStrike" kern="1200" cap="none" spc="0" normalizeH="0" baseline="0" noProof="0" dirty="0" smtClean="0">
-                <a:ln>
-                  <a:noFill/>
-                </a:ln>
-                <a:solidFill>
-                  <a:schemeClr val="tx1"/>
-                </a:solidFill>
-                <a:effectLst/>
-                <a:uLnTx/>
-                <a:uFillTx/>
-                <a:latin typeface="Cambria" pitchFamily="18" charset="0"/>
-                <a:ea typeface="+mn-ea"/>
-                <a:cs typeface="+mn-cs"/>
-              </a:rPr>
-              <a:t> Institute of Technology,</a:t>
-            </a:r>
-          </a:p>
-          <a:p>
-            <a:pPr marL="342900" marR="0" lvl="0" indent="-342900" algn="r" defTabSz="914400" rtl="0" eaLnBrk="1" fontAlgn="auto" latinLnBrk="0" hangingPunct="1">
-              <a:lnSpc>
-                <a:spcPct val="100000"/>
-              </a:lnSpc>
-              <a:spcBef>
-                <a:spcPct val="20000"/>
-              </a:spcBef>
-              <a:spcAft>
-                <a:spcPts val="0"/>
-              </a:spcAft>
-              <a:buClrTx/>
-              <a:buSzTx/>
-              <a:tabLst/>
-              <a:defRPr/>
-            </a:pPr>
-            <a:r>
-              <a:rPr kumimoji="0" lang="en-US" sz="1600" b="0" i="0" u="none" strike="noStrike" kern="1200" cap="none" spc="0" normalizeH="0" baseline="0" noProof="0" dirty="0" smtClean="0">
-                <a:ln>
-                  <a:noFill/>
-                </a:ln>
-                <a:solidFill>
-                  <a:schemeClr val="tx1"/>
-                </a:solidFill>
-                <a:effectLst/>
-                <a:uLnTx/>
-                <a:uFillTx/>
-                <a:latin typeface="Cambria" pitchFamily="18" charset="0"/>
-                <a:ea typeface="+mn-ea"/>
-                <a:cs typeface="+mn-cs"/>
-              </a:rPr>
-              <a:t>email: </a:t>
-            </a:r>
-            <a:r>
-              <a:rPr kumimoji="0" lang="en-US" sz="1600" b="0" i="0" u="none" strike="noStrike" kern="1200" cap="none" spc="0" normalizeH="0" baseline="0" noProof="0" dirty="0" smtClean="0">
-                <a:ln>
-                  <a:noFill/>
-                </a:ln>
-                <a:solidFill>
-                  <a:schemeClr val="tx1"/>
-                </a:solidFill>
-                <a:effectLst/>
-                <a:uLnTx/>
-                <a:uFillTx/>
-                <a:latin typeface="Cambria" pitchFamily="18" charset="0"/>
-                <a:ea typeface="+mn-ea"/>
-                <a:cs typeface="+mn-cs"/>
-                <a:hlinkClick r:id="rId2"/>
-              </a:rPr>
-              <a:t>proffraja@gmail.com</a:t>
-            </a:r>
-            <a:endParaRPr lang="en-US" sz="1600" dirty="0" smtClean="0">
-              <a:latin typeface="Cambria" pitchFamily="18" charset="0"/>
-            </a:endParaRPr>
-          </a:p>
-          <a:p>
-            <a:pPr marL="342900" marR="0" lvl="0" indent="-342900" algn="r" defTabSz="914400" rtl="0" eaLnBrk="1" fontAlgn="auto" latinLnBrk="0" hangingPunct="1">
-              <a:lnSpc>
-                <a:spcPct val="100000"/>
-              </a:lnSpc>
-              <a:spcBef>
-                <a:spcPct val="20000"/>
-              </a:spcBef>
-              <a:spcAft>
-                <a:spcPts val="0"/>
-              </a:spcAft>
-              <a:buClrTx/>
-              <a:buSzTx/>
-              <a:tabLst/>
-              <a:defRPr/>
-            </a:pPr>
-            <a:r>
-              <a:rPr lang="en-US" sz="1600" dirty="0" err="1" smtClean="0">
-                <a:latin typeface="Cambria" pitchFamily="18" charset="0"/>
-              </a:rPr>
-              <a:t>Github:</a:t>
-            </a:r>
-            <a:r>
-              <a:rPr lang="en-US" sz="1600" dirty="0" err="1" smtClean="0">
-                <a:latin typeface="Cambria" pitchFamily="18" charset="0"/>
-                <a:hlinkClick r:id="rId3"/>
-              </a:rPr>
-              <a:t>www.github.com</a:t>
-            </a:r>
-            <a:r>
-              <a:rPr lang="en-US" sz="1600" dirty="0" smtClean="0">
-                <a:latin typeface="Cambria" pitchFamily="18" charset="0"/>
-                <a:hlinkClick r:id="rId3"/>
-              </a:rPr>
-              <a:t>/</a:t>
-            </a:r>
-            <a:r>
-              <a:rPr lang="en-US" sz="1600" dirty="0" err="1" smtClean="0">
-                <a:latin typeface="Cambria" pitchFamily="18" charset="0"/>
-                <a:hlinkClick r:id="rId3"/>
-              </a:rPr>
-              <a:t>rajasekaranap</a:t>
-            </a:r>
-            <a:endParaRPr lang="en-US" sz="1600" dirty="0" smtClean="0">
-              <a:latin typeface="Cambria" pitchFamily="18" charset="0"/>
-            </a:endParaRPr>
-          </a:p>
-          <a:p>
-            <a:pPr marL="342900" marR="0" lvl="0" indent="-342900" algn="r" defTabSz="914400" rtl="0" eaLnBrk="1" fontAlgn="auto" latinLnBrk="0" hangingPunct="1">
-              <a:lnSpc>
-                <a:spcPct val="100000"/>
-              </a:lnSpc>
-              <a:spcBef>
-                <a:spcPct val="20000"/>
-              </a:spcBef>
-              <a:spcAft>
-                <a:spcPts val="0"/>
-              </a:spcAft>
-              <a:buClrTx/>
-              <a:buSzTx/>
-              <a:tabLst/>
-              <a:defRPr/>
-            </a:pPr>
-            <a:endParaRPr lang="en-US" sz="1600" dirty="0" smtClean="0">
-              <a:latin typeface="Cambria" pitchFamily="18" charset="0"/>
-            </a:endParaRPr>
+            <a:r>
+              <a:rPr lang="en-IN" dirty="0" smtClean="0"/>
+              <a:t>It is constrictor with arguments.</a:t>
+            </a:r>
+          </a:p>
+          <a:p>
+            <a:r>
+              <a:rPr lang="en-IN" dirty="0" smtClean="0"/>
+              <a:t>It receives the argument from user at the time of object creation.</a:t>
+            </a:r>
+          </a:p>
+          <a:p>
+            <a:r>
+              <a:rPr lang="en-IN" dirty="0" smtClean="0"/>
+              <a:t>It initialize those values for data members instead of user defined defaults. </a:t>
+            </a:r>
+            <a:endParaRPr lang="en-US" dirty="0"/>
           </a:p>
         </p:txBody>
       </p:sp>

</xml_diff>